<commit_message>
Finish up presentation 3
</commit_message>
<xml_diff>
--- a/presentations/3/part_formatting/string_formatting.pptx
+++ b/presentations/3/part_formatting/string_formatting.pptx
@@ -398,14 +398,14 @@
           <a:effectLst/>
           <a:extLst>
             <a:ext uri="{909E8E84-426E-40dd-AFC4-6F175D3DCCD1}">
-              <a14:hiddenFill xmlns="" xmlns:a14="http://schemas.microsoft.com/office/drawing/2010/main">
+              <a14:hiddenFill xmlns:a14="http://schemas.microsoft.com/office/drawing/2010/main" xmlns="">
                 <a:solidFill>
                   <a:schemeClr val="accent1"/>
                 </a:solidFill>
               </a14:hiddenFill>
             </a:ext>
             <a:ext uri="{91240B29-F687-4f45-9708-019B960494DF}">
-              <a14:hiddenLine xmlns="" xmlns:a14="http://schemas.microsoft.com/office/drawing/2010/main" w="9525">
+              <a14:hiddenLine xmlns:a14="http://schemas.microsoft.com/office/drawing/2010/main" xmlns="" w="9525">
                 <a:solidFill>
                   <a:schemeClr val="tx1"/>
                 </a:solidFill>
@@ -415,7 +415,7 @@
               </a14:hiddenLine>
             </a:ext>
             <a:ext uri="{AF507438-7753-43e0-B8FC-AC1667EBCBE1}">
-              <a14:hiddenEffects xmlns="" xmlns:a14="http://schemas.microsoft.com/office/drawing/2010/main">
+              <a14:hiddenEffects xmlns:a14="http://schemas.microsoft.com/office/drawing/2010/main" xmlns="">
                 <a:effectLst>
                   <a:outerShdw dist="35921" dir="2700000" algn="ctr" rotWithShape="0">
                     <a:schemeClr val="bg2"/>
@@ -729,14 +729,14 @@
           <a:effectLst/>
           <a:extLst>
             <a:ext uri="{909E8E84-426E-40dd-AFC4-6F175D3DCCD1}">
-              <a14:hiddenFill xmlns="" xmlns:a14="http://schemas.microsoft.com/office/drawing/2010/main">
+              <a14:hiddenFill xmlns:a14="http://schemas.microsoft.com/office/drawing/2010/main" xmlns="">
                 <a:solidFill>
                   <a:schemeClr val="accent1"/>
                 </a:solidFill>
               </a14:hiddenFill>
             </a:ext>
             <a:ext uri="{91240B29-F687-4f45-9708-019B960494DF}">
-              <a14:hiddenLine xmlns="" xmlns:a14="http://schemas.microsoft.com/office/drawing/2010/main" w="9525">
+              <a14:hiddenLine xmlns:a14="http://schemas.microsoft.com/office/drawing/2010/main" xmlns="" w="9525">
                 <a:solidFill>
                   <a:schemeClr val="tx1"/>
                 </a:solidFill>
@@ -746,7 +746,7 @@
               </a14:hiddenLine>
             </a:ext>
             <a:ext uri="{AF507438-7753-43e0-B8FC-AC1667EBCBE1}">
-              <a14:hiddenEffects xmlns="" xmlns:a14="http://schemas.microsoft.com/office/drawing/2010/main">
+              <a14:hiddenEffects xmlns:a14="http://schemas.microsoft.com/office/drawing/2010/main" xmlns="">
                 <a:effectLst>
                   <a:outerShdw dist="35921" dir="2700000" algn="ctr" rotWithShape="0">
                     <a:schemeClr val="bg2"/>
@@ -1538,14 +1538,14 @@
           </a:ln>
           <a:extLst>
             <a:ext uri="{909E8E84-426E-40dd-AFC4-6F175D3DCCD1}">
-              <a14:hiddenFill xmlns="" xmlns:a14="http://schemas.microsoft.com/office/drawing/2010/main">
+              <a14:hiddenFill xmlns:a14="http://schemas.microsoft.com/office/drawing/2010/main" xmlns="">
                 <a:solidFill>
                   <a:srgbClr val="FFFFFF"/>
                 </a:solidFill>
               </a14:hiddenFill>
             </a:ext>
             <a:ext uri="{91240B29-F687-4f45-9708-019B960494DF}">
-              <a14:hiddenLine xmlns="" xmlns:a14="http://schemas.microsoft.com/office/drawing/2010/main" w="9525">
+              <a14:hiddenLine xmlns:a14="http://schemas.microsoft.com/office/drawing/2010/main" xmlns="" w="9525">
                 <a:solidFill>
                   <a:srgbClr val="000000"/>
                 </a:solidFill>
@@ -1946,14 +1946,14 @@
           </a:ln>
           <a:extLst>
             <a:ext uri="{909E8E84-426E-40dd-AFC4-6F175D3DCCD1}">
-              <a14:hiddenFill xmlns="" xmlns:a14="http://schemas.microsoft.com/office/drawing/2010/main">
+              <a14:hiddenFill xmlns:a14="http://schemas.microsoft.com/office/drawing/2010/main" xmlns="">
                 <a:solidFill>
                   <a:srgbClr val="FFFFFF"/>
                 </a:solidFill>
               </a14:hiddenFill>
             </a:ext>
             <a:ext uri="{91240B29-F687-4f45-9708-019B960494DF}">
-              <a14:hiddenLine xmlns="" xmlns:a14="http://schemas.microsoft.com/office/drawing/2010/main" w="9525">
+              <a14:hiddenLine xmlns:a14="http://schemas.microsoft.com/office/drawing/2010/main" xmlns="" w="9525">
                 <a:solidFill>
                   <a:srgbClr val="000000"/>
                 </a:solidFill>
@@ -2354,14 +2354,14 @@
           </a:ln>
           <a:extLst>
             <a:ext uri="{909E8E84-426E-40dd-AFC4-6F175D3DCCD1}">
-              <a14:hiddenFill xmlns="" xmlns:a14="http://schemas.microsoft.com/office/drawing/2010/main">
+              <a14:hiddenFill xmlns:a14="http://schemas.microsoft.com/office/drawing/2010/main" xmlns="">
                 <a:solidFill>
                   <a:srgbClr val="FFFFFF"/>
                 </a:solidFill>
               </a14:hiddenFill>
             </a:ext>
             <a:ext uri="{91240B29-F687-4f45-9708-019B960494DF}">
-              <a14:hiddenLine xmlns="" xmlns:a14="http://schemas.microsoft.com/office/drawing/2010/main" w="9525">
+              <a14:hiddenLine xmlns:a14="http://schemas.microsoft.com/office/drawing/2010/main" xmlns="" w="9525">
                 <a:solidFill>
                   <a:srgbClr val="000000"/>
                 </a:solidFill>
@@ -3627,14 +3627,14 @@
           </a:ln>
           <a:extLst>
             <a:ext uri="{909E8E84-426E-40dd-AFC4-6F175D3DCCD1}">
-              <a14:hiddenFill xmlns="" xmlns:a14="http://schemas.microsoft.com/office/drawing/2010/main">
+              <a14:hiddenFill xmlns:a14="http://schemas.microsoft.com/office/drawing/2010/main" xmlns="">
                 <a:solidFill>
                   <a:srgbClr val="FFFFFF"/>
                 </a:solidFill>
               </a14:hiddenFill>
             </a:ext>
             <a:ext uri="{91240B29-F687-4f45-9708-019B960494DF}">
-              <a14:hiddenLine xmlns="" xmlns:a14="http://schemas.microsoft.com/office/drawing/2010/main" w="9525">
+              <a14:hiddenLine xmlns:a14="http://schemas.microsoft.com/office/drawing/2010/main" xmlns="" w="9525">
                 <a:solidFill>
                   <a:srgbClr val="000000"/>
                 </a:solidFill>
@@ -4969,7 +4969,7 @@
           <a:p>
             <a:fld id="{0FAD7AA3-9FCC-4FE2-89B8-AC573E8A1B2C}" type="datetimeFigureOut">
               <a:rPr lang="en-US" smtClean="0"/>
-              <a:t>11/12/2020</a:t>
+              <a:t>11/13/2020</a:t>
             </a:fld>
             <a:endParaRPr lang="en-US"/>
           </a:p>
@@ -5088,14 +5088,14 @@
           </a:ln>
           <a:extLst>
             <a:ext uri="{909E8E84-426E-40dd-AFC4-6F175D3DCCD1}">
-              <a14:hiddenFill xmlns="" xmlns:a14="http://schemas.microsoft.com/office/drawing/2010/main">
+              <a14:hiddenFill xmlns:a14="http://schemas.microsoft.com/office/drawing/2010/main" xmlns="">
                 <a:solidFill>
                   <a:srgbClr val="FFFFFF"/>
                 </a:solidFill>
               </a14:hiddenFill>
             </a:ext>
             <a:ext uri="{91240B29-F687-4f45-9708-019B960494DF}">
-              <a14:hiddenLine xmlns="" xmlns:a14="http://schemas.microsoft.com/office/drawing/2010/main" w="9525">
+              <a14:hiddenLine xmlns:a14="http://schemas.microsoft.com/office/drawing/2010/main" xmlns="" w="9525">
                 <a:solidFill>
                   <a:srgbClr val="000000"/>
                 </a:solidFill>
@@ -5187,14 +5187,14 @@
           </a:ln>
           <a:extLst>
             <a:ext uri="{909E8E84-426E-40dd-AFC4-6F175D3DCCD1}">
-              <a14:hiddenFill xmlns="" xmlns:a14="http://schemas.microsoft.com/office/drawing/2010/main">
+              <a14:hiddenFill xmlns:a14="http://schemas.microsoft.com/office/drawing/2010/main" xmlns="">
                 <a:solidFill>
                   <a:srgbClr val="FFFFFF"/>
                 </a:solidFill>
               </a14:hiddenFill>
             </a:ext>
             <a:ext uri="{91240B29-F687-4f45-9708-019B960494DF}">
-              <a14:hiddenLine xmlns="" xmlns:a14="http://schemas.microsoft.com/office/drawing/2010/main" w="9525">
+              <a14:hiddenLine xmlns:a14="http://schemas.microsoft.com/office/drawing/2010/main" xmlns="" w="9525">
                 <a:solidFill>
                   <a:srgbClr val="000000"/>
                 </a:solidFill>
@@ -5352,14 +5352,14 @@
           </a:ln>
           <a:extLst>
             <a:ext uri="{909E8E84-426E-40dd-AFC4-6F175D3DCCD1}">
-              <a14:hiddenFill xmlns="" xmlns:a14="http://schemas.microsoft.com/office/drawing/2010/main">
+              <a14:hiddenFill xmlns:a14="http://schemas.microsoft.com/office/drawing/2010/main" xmlns="">
                 <a:solidFill>
                   <a:srgbClr val="FFFFFF"/>
                 </a:solidFill>
               </a14:hiddenFill>
             </a:ext>
             <a:ext uri="{91240B29-F687-4f45-9708-019B960494DF}">
-              <a14:hiddenLine xmlns="" xmlns:a14="http://schemas.microsoft.com/office/drawing/2010/main" w="9525">
+              <a14:hiddenLine xmlns:a14="http://schemas.microsoft.com/office/drawing/2010/main" xmlns="" w="9525">
                 <a:solidFill>
                   <a:srgbClr val="000000"/>
                 </a:solidFill>
@@ -6145,14 +6145,14 @@
           </a:ln>
           <a:extLst>
             <a:ext uri="{909E8E84-426E-40dd-AFC4-6F175D3DCCD1}">
-              <a14:hiddenFill xmlns:a14="http://schemas.microsoft.com/office/drawing/2010/main" xmlns="">
+              <a14:hiddenFill xmlns="" xmlns:a14="http://schemas.microsoft.com/office/drawing/2010/main">
                 <a:solidFill>
                   <a:srgbClr val="FFFFFF"/>
                 </a:solidFill>
               </a14:hiddenFill>
             </a:ext>
             <a:ext uri="{91240B29-F687-4f45-9708-019B960494DF}">
-              <a14:hiddenLine xmlns:a14="http://schemas.microsoft.com/office/drawing/2010/main" xmlns="" w="9525">
+              <a14:hiddenLine xmlns="" xmlns:a14="http://schemas.microsoft.com/office/drawing/2010/main" w="9525">
                 <a:solidFill>
                   <a:srgbClr val="000000"/>
                 </a:solidFill>
@@ -6244,14 +6244,14 @@
           </a:ln>
           <a:extLst>
             <a:ext uri="{909E8E84-426E-40dd-AFC4-6F175D3DCCD1}">
-              <a14:hiddenFill xmlns:a14="http://schemas.microsoft.com/office/drawing/2010/main" xmlns="">
+              <a14:hiddenFill xmlns="" xmlns:a14="http://schemas.microsoft.com/office/drawing/2010/main">
                 <a:solidFill>
                   <a:srgbClr val="FFFFFF"/>
                 </a:solidFill>
               </a14:hiddenFill>
             </a:ext>
             <a:ext uri="{91240B29-F687-4f45-9708-019B960494DF}">
-              <a14:hiddenLine xmlns:a14="http://schemas.microsoft.com/office/drawing/2010/main" xmlns="" w="9525">
+              <a14:hiddenLine xmlns="" xmlns:a14="http://schemas.microsoft.com/office/drawing/2010/main" w="9525">
                 <a:solidFill>
                   <a:srgbClr val="000000"/>
                 </a:solidFill>
@@ -6409,14 +6409,14 @@
           </a:ln>
           <a:extLst>
             <a:ext uri="{909E8E84-426E-40dd-AFC4-6F175D3DCCD1}">
-              <a14:hiddenFill xmlns:a14="http://schemas.microsoft.com/office/drawing/2010/main" xmlns="">
+              <a14:hiddenFill xmlns="" xmlns:a14="http://schemas.microsoft.com/office/drawing/2010/main">
                 <a:solidFill>
                   <a:srgbClr val="FFFFFF"/>
                 </a:solidFill>
               </a14:hiddenFill>
             </a:ext>
             <a:ext uri="{91240B29-F687-4f45-9708-019B960494DF}">
-              <a14:hiddenLine xmlns:a14="http://schemas.microsoft.com/office/drawing/2010/main" xmlns="" w="9525">
+              <a14:hiddenLine xmlns="" xmlns:a14="http://schemas.microsoft.com/office/drawing/2010/main" w="9525">
                 <a:solidFill>
                   <a:srgbClr val="000000"/>
                 </a:solidFill>
@@ -6526,14 +6526,14 @@
           </a:ln>
           <a:extLst>
             <a:ext uri="{909E8E84-426E-40dd-AFC4-6F175D3DCCD1}">
-              <a14:hiddenFill xmlns:a14="http://schemas.microsoft.com/office/drawing/2010/main" xmlns="">
+              <a14:hiddenFill xmlns="" xmlns:a14="http://schemas.microsoft.com/office/drawing/2010/main">
                 <a:solidFill>
                   <a:srgbClr val="FFFFFF"/>
                 </a:solidFill>
               </a14:hiddenFill>
             </a:ext>
             <a:ext uri="{91240B29-F687-4f45-9708-019B960494DF}">
-              <a14:hiddenLine xmlns:a14="http://schemas.microsoft.com/office/drawing/2010/main" xmlns="" w="9525">
+              <a14:hiddenLine xmlns="" xmlns:a14="http://schemas.microsoft.com/office/drawing/2010/main" w="9525">
                 <a:solidFill>
                   <a:srgbClr val="000000"/>
                 </a:solidFill>
@@ -7242,14 +7242,14 @@
           </a:ln>
           <a:extLst>
             <a:ext uri="{909E8E84-426E-40dd-AFC4-6F175D3DCCD1}">
-              <a14:hiddenFill xmlns="" xmlns:a14="http://schemas.microsoft.com/office/drawing/2010/main">
+              <a14:hiddenFill xmlns:a14="http://schemas.microsoft.com/office/drawing/2010/main" xmlns="">
                 <a:solidFill>
                   <a:srgbClr val="FFFFFF"/>
                 </a:solidFill>
               </a14:hiddenFill>
             </a:ext>
             <a:ext uri="{91240B29-F687-4f45-9708-019B960494DF}">
-              <a14:hiddenLine xmlns="" xmlns:a14="http://schemas.microsoft.com/office/drawing/2010/main" w="9525">
+              <a14:hiddenLine xmlns:a14="http://schemas.microsoft.com/office/drawing/2010/main" xmlns="" w="9525">
                 <a:solidFill>
                   <a:srgbClr val="000000"/>
                 </a:solidFill>
@@ -7379,14 +7379,14 @@
           </a:ln>
           <a:extLst>
             <a:ext uri="{909E8E84-426E-40dd-AFC4-6F175D3DCCD1}">
-              <a14:hiddenFill xmlns="" xmlns:a14="http://schemas.microsoft.com/office/drawing/2010/main">
+              <a14:hiddenFill xmlns:a14="http://schemas.microsoft.com/office/drawing/2010/main" xmlns="">
                 <a:solidFill>
                   <a:srgbClr val="FFFFFF"/>
                 </a:solidFill>
               </a14:hiddenFill>
             </a:ext>
             <a:ext uri="{91240B29-F687-4f45-9708-019B960494DF}">
-              <a14:hiddenLine xmlns="" xmlns:a14="http://schemas.microsoft.com/office/drawing/2010/main" w="9525">
+              <a14:hiddenLine xmlns:a14="http://schemas.microsoft.com/office/drawing/2010/main" xmlns="" w="9525">
                 <a:solidFill>
                   <a:srgbClr val="000000"/>
                 </a:solidFill>
@@ -7617,14 +7617,14 @@
           </a:ln>
           <a:extLst>
             <a:ext uri="{909E8E84-426E-40dd-AFC4-6F175D3DCCD1}">
-              <a14:hiddenFill xmlns="" xmlns:a14="http://schemas.microsoft.com/office/drawing/2010/main">
+              <a14:hiddenFill xmlns:a14="http://schemas.microsoft.com/office/drawing/2010/main" xmlns="">
                 <a:solidFill>
                   <a:srgbClr val="FFFFFF"/>
                 </a:solidFill>
               </a14:hiddenFill>
             </a:ext>
             <a:ext uri="{91240B29-F687-4f45-9708-019B960494DF}">
-              <a14:hiddenLine xmlns="" xmlns:a14="http://schemas.microsoft.com/office/drawing/2010/main" w="9525">
+              <a14:hiddenLine xmlns:a14="http://schemas.microsoft.com/office/drawing/2010/main" xmlns="" w="9525">
                 <a:solidFill>
                   <a:srgbClr val="000000"/>
                 </a:solidFill>
@@ -7757,14 +7757,14 @@
           </a:ln>
           <a:extLst>
             <a:ext uri="{909E8E84-426E-40dd-AFC4-6F175D3DCCD1}">
-              <a14:hiddenFill xmlns="" xmlns:a14="http://schemas.microsoft.com/office/drawing/2010/main">
+              <a14:hiddenFill xmlns:a14="http://schemas.microsoft.com/office/drawing/2010/main" xmlns="">
                 <a:solidFill>
                   <a:srgbClr val="FFFFFF"/>
                 </a:solidFill>
               </a14:hiddenFill>
             </a:ext>
             <a:ext uri="{91240B29-F687-4f45-9708-019B960494DF}">
-              <a14:hiddenLine xmlns="" xmlns:a14="http://schemas.microsoft.com/office/drawing/2010/main" w="9525">
+              <a14:hiddenLine xmlns:a14="http://schemas.microsoft.com/office/drawing/2010/main" xmlns="" w="9525">
                 <a:solidFill>
                   <a:srgbClr val="000000"/>
                 </a:solidFill>
@@ -7823,14 +7823,14 @@
           </a:ln>
           <a:extLst>
             <a:ext uri="{909E8E84-426E-40dd-AFC4-6F175D3DCCD1}">
-              <a14:hiddenFill xmlns="" xmlns:a14="http://schemas.microsoft.com/office/drawing/2010/main">
+              <a14:hiddenFill xmlns:a14="http://schemas.microsoft.com/office/drawing/2010/main" xmlns="">
                 <a:solidFill>
                   <a:srgbClr val="FFFFFF"/>
                 </a:solidFill>
               </a14:hiddenFill>
             </a:ext>
             <a:ext uri="{91240B29-F687-4f45-9708-019B960494DF}">
-              <a14:hiddenLine xmlns="" xmlns:a14="http://schemas.microsoft.com/office/drawing/2010/main" w="9525">
+              <a14:hiddenLine xmlns:a14="http://schemas.microsoft.com/office/drawing/2010/main" xmlns="" w="9525">
                 <a:solidFill>
                   <a:srgbClr val="000000"/>
                 </a:solidFill>
@@ -7894,14 +7894,14 @@
           </a:ln>
           <a:extLst>
             <a:ext uri="{909E8E84-426E-40dd-AFC4-6F175D3DCCD1}">
-              <a14:hiddenFill xmlns="" xmlns:a14="http://schemas.microsoft.com/office/drawing/2010/main">
+              <a14:hiddenFill xmlns:a14="http://schemas.microsoft.com/office/drawing/2010/main" xmlns="">
                 <a:solidFill>
                   <a:srgbClr val="FFFFFF"/>
                 </a:solidFill>
               </a14:hiddenFill>
             </a:ext>
             <a:ext uri="{91240B29-F687-4f45-9708-019B960494DF}">
-              <a14:hiddenLine xmlns="" xmlns:a14="http://schemas.microsoft.com/office/drawing/2010/main" w="9525">
+              <a14:hiddenLine xmlns:a14="http://schemas.microsoft.com/office/drawing/2010/main" xmlns="" w="9525">
                 <a:solidFill>
                   <a:srgbClr val="000000"/>
                 </a:solidFill>
@@ -8151,14 +8151,14 @@
           </a:ln>
           <a:extLst>
             <a:ext uri="{909E8E84-426E-40dd-AFC4-6F175D3DCCD1}">
-              <a14:hiddenFill xmlns="" xmlns:a14="http://schemas.microsoft.com/office/drawing/2010/main">
+              <a14:hiddenFill xmlns:a14="http://schemas.microsoft.com/office/drawing/2010/main" xmlns="">
                 <a:solidFill>
                   <a:srgbClr val="FFFFFF"/>
                 </a:solidFill>
               </a14:hiddenFill>
             </a:ext>
             <a:ext uri="{91240B29-F687-4f45-9708-019B960494DF}">
-              <a14:hiddenLine xmlns="" xmlns:a14="http://schemas.microsoft.com/office/drawing/2010/main" w="9525">
+              <a14:hiddenLine xmlns:a14="http://schemas.microsoft.com/office/drawing/2010/main" xmlns="" w="9525">
                 <a:solidFill>
                   <a:srgbClr val="000000"/>
                 </a:solidFill>
@@ -8305,14 +8305,14 @@
           </a:ln>
           <a:extLst>
             <a:ext uri="{909E8E84-426E-40dd-AFC4-6F175D3DCCD1}">
-              <a14:hiddenFill xmlns="" xmlns:a14="http://schemas.microsoft.com/office/drawing/2010/main">
+              <a14:hiddenFill xmlns:a14="http://schemas.microsoft.com/office/drawing/2010/main" xmlns="">
                 <a:solidFill>
                   <a:srgbClr val="FFFFFF"/>
                 </a:solidFill>
               </a14:hiddenFill>
             </a:ext>
             <a:ext uri="{91240B29-F687-4f45-9708-019B960494DF}">
-              <a14:hiddenLine xmlns="" xmlns:a14="http://schemas.microsoft.com/office/drawing/2010/main" w="9525">
+              <a14:hiddenLine xmlns:a14="http://schemas.microsoft.com/office/drawing/2010/main" xmlns="" w="9525">
                 <a:solidFill>
                   <a:srgbClr val="000000"/>
                 </a:solidFill>
@@ -9150,14 +9150,14 @@
           </a:ln>
           <a:extLst>
             <a:ext uri="{909E8E84-426E-40dd-AFC4-6F175D3DCCD1}">
-              <a14:hiddenFill xmlns="" xmlns:a14="http://schemas.microsoft.com/office/drawing/2010/main">
+              <a14:hiddenFill xmlns:a14="http://schemas.microsoft.com/office/drawing/2010/main" xmlns="">
                 <a:solidFill>
                   <a:srgbClr val="FFFFFF"/>
                 </a:solidFill>
               </a14:hiddenFill>
             </a:ext>
             <a:ext uri="{91240B29-F687-4f45-9708-019B960494DF}">
-              <a14:hiddenLine xmlns="" xmlns:a14="http://schemas.microsoft.com/office/drawing/2010/main" w="9525">
+              <a14:hiddenLine xmlns:a14="http://schemas.microsoft.com/office/drawing/2010/main" xmlns="" w="9525">
                 <a:solidFill>
                   <a:srgbClr val="000000"/>
                 </a:solidFill>
@@ -9778,14 +9778,14 @@
           </a:ln>
           <a:extLst>
             <a:ext uri="{909E8E84-426E-40dd-AFC4-6F175D3DCCD1}">
-              <a14:hiddenFill xmlns="" xmlns:a14="http://schemas.microsoft.com/office/drawing/2010/main">
+              <a14:hiddenFill xmlns:a14="http://schemas.microsoft.com/office/drawing/2010/main" xmlns="">
                 <a:solidFill>
                   <a:srgbClr val="FFFFFF"/>
                 </a:solidFill>
               </a14:hiddenFill>
             </a:ext>
             <a:ext uri="{91240B29-F687-4f45-9708-019B960494DF}">
-              <a14:hiddenLine xmlns="" xmlns:a14="http://schemas.microsoft.com/office/drawing/2010/main" w="9525">
+              <a14:hiddenLine xmlns:a14="http://schemas.microsoft.com/office/drawing/2010/main" xmlns="" w="9525">
                 <a:solidFill>
                   <a:srgbClr val="000000"/>
                 </a:solidFill>
@@ -9848,14 +9848,14 @@
           </a:ln>
           <a:extLst>
             <a:ext uri="{909E8E84-426E-40dd-AFC4-6F175D3DCCD1}">
-              <a14:hiddenFill xmlns="" xmlns:a14="http://schemas.microsoft.com/office/drawing/2010/main">
+              <a14:hiddenFill xmlns:a14="http://schemas.microsoft.com/office/drawing/2010/main" xmlns="">
                 <a:solidFill>
                   <a:srgbClr val="FFFFFF"/>
                 </a:solidFill>
               </a14:hiddenFill>
             </a:ext>
             <a:ext uri="{91240B29-F687-4f45-9708-019B960494DF}">
-              <a14:hiddenLine xmlns="" xmlns:a14="http://schemas.microsoft.com/office/drawing/2010/main" w="9525">
+              <a14:hiddenLine xmlns:a14="http://schemas.microsoft.com/office/drawing/2010/main" xmlns="" w="9525">
                 <a:solidFill>
                   <a:srgbClr val="000000"/>
                 </a:solidFill>
@@ -9918,14 +9918,14 @@
           </a:ln>
           <a:extLst>
             <a:ext uri="{909E8E84-426E-40dd-AFC4-6F175D3DCCD1}">
-              <a14:hiddenFill xmlns="" xmlns:a14="http://schemas.microsoft.com/office/drawing/2010/main">
+              <a14:hiddenFill xmlns:a14="http://schemas.microsoft.com/office/drawing/2010/main" xmlns="">
                 <a:solidFill>
                   <a:srgbClr val="FFFFFF"/>
                 </a:solidFill>
               </a14:hiddenFill>
             </a:ext>
             <a:ext uri="{91240B29-F687-4f45-9708-019B960494DF}">
-              <a14:hiddenLine xmlns="" xmlns:a14="http://schemas.microsoft.com/office/drawing/2010/main" w="9525">
+              <a14:hiddenLine xmlns:a14="http://schemas.microsoft.com/office/drawing/2010/main" xmlns="" w="9525">
                 <a:solidFill>
                   <a:srgbClr val="000000"/>
                 </a:solidFill>
@@ -9986,14 +9986,14 @@
           </a:ln>
           <a:extLst>
             <a:ext uri="{909E8E84-426E-40dd-AFC4-6F175D3DCCD1}">
-              <a14:hiddenFill xmlns="" xmlns:a14="http://schemas.microsoft.com/office/drawing/2010/main">
+              <a14:hiddenFill xmlns:a14="http://schemas.microsoft.com/office/drawing/2010/main" xmlns="">
                 <a:solidFill>
                   <a:srgbClr val="FFFFFF"/>
                 </a:solidFill>
               </a14:hiddenFill>
             </a:ext>
             <a:ext uri="{91240B29-F687-4f45-9708-019B960494DF}">
-              <a14:hiddenLine xmlns="" xmlns:a14="http://schemas.microsoft.com/office/drawing/2010/main" w="9525">
+              <a14:hiddenLine xmlns:a14="http://schemas.microsoft.com/office/drawing/2010/main" xmlns="" w="9525">
                 <a:solidFill>
                   <a:srgbClr val="000000"/>
                 </a:solidFill>
@@ -10054,14 +10054,14 @@
           </a:ln>
           <a:extLst>
             <a:ext uri="{909E8E84-426E-40dd-AFC4-6F175D3DCCD1}">
-              <a14:hiddenFill xmlns="" xmlns:a14="http://schemas.microsoft.com/office/drawing/2010/main">
+              <a14:hiddenFill xmlns:a14="http://schemas.microsoft.com/office/drawing/2010/main" xmlns="">
                 <a:solidFill>
                   <a:srgbClr val="FFFFFF"/>
                 </a:solidFill>
               </a14:hiddenFill>
             </a:ext>
             <a:ext uri="{91240B29-F687-4f45-9708-019B960494DF}">
-              <a14:hiddenLine xmlns="" xmlns:a14="http://schemas.microsoft.com/office/drawing/2010/main" w="9525">
+              <a14:hiddenLine xmlns:a14="http://schemas.microsoft.com/office/drawing/2010/main" xmlns="" w="9525">
                 <a:solidFill>
                   <a:srgbClr val="000000"/>
                 </a:solidFill>
@@ -10122,14 +10122,14 @@
           </a:ln>
           <a:extLst>
             <a:ext uri="{909E8E84-426E-40dd-AFC4-6F175D3DCCD1}">
-              <a14:hiddenFill xmlns="" xmlns:a14="http://schemas.microsoft.com/office/drawing/2010/main">
+              <a14:hiddenFill xmlns:a14="http://schemas.microsoft.com/office/drawing/2010/main" xmlns="">
                 <a:solidFill>
                   <a:srgbClr val="FFFFFF"/>
                 </a:solidFill>
               </a14:hiddenFill>
             </a:ext>
             <a:ext uri="{91240B29-F687-4f45-9708-019B960494DF}">
-              <a14:hiddenLine xmlns="" xmlns:a14="http://schemas.microsoft.com/office/drawing/2010/main" w="9525">
+              <a14:hiddenLine xmlns:a14="http://schemas.microsoft.com/office/drawing/2010/main" xmlns="" w="9525">
                 <a:solidFill>
                   <a:srgbClr val="000000"/>
                 </a:solidFill>
@@ -10866,14 +10866,14 @@
           </a:ln>
           <a:extLst>
             <a:ext uri="{909E8E84-426E-40dd-AFC4-6F175D3DCCD1}">
-              <a14:hiddenFill xmlns="" xmlns:a14="http://schemas.microsoft.com/office/drawing/2010/main">
+              <a14:hiddenFill xmlns:a14="http://schemas.microsoft.com/office/drawing/2010/main" xmlns="">
                 <a:solidFill>
                   <a:srgbClr val="FFFFFF"/>
                 </a:solidFill>
               </a14:hiddenFill>
             </a:ext>
             <a:ext uri="{91240B29-F687-4f45-9708-019B960494DF}">
-              <a14:hiddenLine xmlns="" xmlns:a14="http://schemas.microsoft.com/office/drawing/2010/main" w="9525">
+              <a14:hiddenLine xmlns:a14="http://schemas.microsoft.com/office/drawing/2010/main" xmlns="" w="9525">
                 <a:solidFill>
                   <a:srgbClr val="000000"/>
                 </a:solidFill>
@@ -11046,14 +11046,14 @@
           </a:ln>
           <a:extLst>
             <a:ext uri="{909E8E84-426E-40dd-AFC4-6F175D3DCCD1}">
-              <a14:hiddenFill xmlns="" xmlns:a14="http://schemas.microsoft.com/office/drawing/2010/main">
+              <a14:hiddenFill xmlns:a14="http://schemas.microsoft.com/office/drawing/2010/main" xmlns="">
                 <a:solidFill>
                   <a:srgbClr val="FFFFFF"/>
                 </a:solidFill>
               </a14:hiddenFill>
             </a:ext>
             <a:ext uri="{91240B29-F687-4f45-9708-019B960494DF}">
-              <a14:hiddenLine xmlns="" xmlns:a14="http://schemas.microsoft.com/office/drawing/2010/main" w="9525">
+              <a14:hiddenLine xmlns:a14="http://schemas.microsoft.com/office/drawing/2010/main" xmlns="" w="9525">
                 <a:solidFill>
                   <a:srgbClr val="000000"/>
                 </a:solidFill>
@@ -11229,14 +11229,14 @@
           </a:ln>
           <a:extLst>
             <a:ext uri="{909E8E84-426E-40dd-AFC4-6F175D3DCCD1}">
-              <a14:hiddenFill xmlns="" xmlns:a14="http://schemas.microsoft.com/office/drawing/2010/main">
+              <a14:hiddenFill xmlns:a14="http://schemas.microsoft.com/office/drawing/2010/main" xmlns="">
                 <a:solidFill>
                   <a:srgbClr val="FFFFFF"/>
                 </a:solidFill>
               </a14:hiddenFill>
             </a:ext>
             <a:ext uri="{91240B29-F687-4f45-9708-019B960494DF}">
-              <a14:hiddenLine xmlns="" xmlns:a14="http://schemas.microsoft.com/office/drawing/2010/main" w="9525">
+              <a14:hiddenLine xmlns:a14="http://schemas.microsoft.com/office/drawing/2010/main" xmlns="" w="9525">
                 <a:solidFill>
                   <a:srgbClr val="000000"/>
                 </a:solidFill>
@@ -11308,14 +11308,14 @@
           </a:ln>
           <a:extLst>
             <a:ext uri="{909E8E84-426E-40dd-AFC4-6F175D3DCCD1}">
-              <a14:hiddenFill xmlns="" xmlns:a14="http://schemas.microsoft.com/office/drawing/2010/main">
+              <a14:hiddenFill xmlns:a14="http://schemas.microsoft.com/office/drawing/2010/main" xmlns="">
                 <a:solidFill>
                   <a:srgbClr val="FFFFFF"/>
                 </a:solidFill>
               </a14:hiddenFill>
             </a:ext>
             <a:ext uri="{91240B29-F687-4f45-9708-019B960494DF}">
-              <a14:hiddenLine xmlns="" xmlns:a14="http://schemas.microsoft.com/office/drawing/2010/main" w="9525">
+              <a14:hiddenLine xmlns:a14="http://schemas.microsoft.com/office/drawing/2010/main" xmlns="" w="9525">
                 <a:solidFill>
                   <a:srgbClr val="000000"/>
                 </a:solidFill>
@@ -11655,14 +11655,14 @@
           </a:ln>
           <a:extLst>
             <a:ext uri="{909E8E84-426E-40dd-AFC4-6F175D3DCCD1}">
-              <a14:hiddenFill xmlns="" xmlns:a14="http://schemas.microsoft.com/office/drawing/2010/main">
+              <a14:hiddenFill xmlns:a14="http://schemas.microsoft.com/office/drawing/2010/main" xmlns="">
                 <a:solidFill>
                   <a:srgbClr val="FFFFFF"/>
                 </a:solidFill>
               </a14:hiddenFill>
             </a:ext>
             <a:ext uri="{91240B29-F687-4f45-9708-019B960494DF}">
-              <a14:hiddenLine xmlns="" xmlns:a14="http://schemas.microsoft.com/office/drawing/2010/main" w="9525">
+              <a14:hiddenLine xmlns:a14="http://schemas.microsoft.com/office/drawing/2010/main" xmlns="" w="9525">
                 <a:solidFill>
                   <a:srgbClr val="000000"/>
                 </a:solidFill>
@@ -11730,14 +11730,14 @@
           </a:ln>
           <a:extLst>
             <a:ext uri="{909E8E84-426E-40dd-AFC4-6F175D3DCCD1}">
-              <a14:hiddenFill xmlns="" xmlns:a14="http://schemas.microsoft.com/office/drawing/2010/main">
+              <a14:hiddenFill xmlns:a14="http://schemas.microsoft.com/office/drawing/2010/main" xmlns="">
                 <a:solidFill>
                   <a:srgbClr val="FFFFFF"/>
                 </a:solidFill>
               </a14:hiddenFill>
             </a:ext>
             <a:ext uri="{91240B29-F687-4f45-9708-019B960494DF}">
-              <a14:hiddenLine xmlns="" xmlns:a14="http://schemas.microsoft.com/office/drawing/2010/main" w="9525">
+              <a14:hiddenLine xmlns:a14="http://schemas.microsoft.com/office/drawing/2010/main" xmlns="" w="9525">
                 <a:solidFill>
                   <a:srgbClr val="000000"/>
                 </a:solidFill>
@@ -12699,14 +12699,14 @@
           </a:ln>
           <a:extLst>
             <a:ext uri="{909E8E84-426E-40dd-AFC4-6F175D3DCCD1}">
-              <a14:hiddenFill xmlns="" xmlns:a14="http://schemas.microsoft.com/office/drawing/2010/main">
+              <a14:hiddenFill xmlns:a14="http://schemas.microsoft.com/office/drawing/2010/main" xmlns="">
                 <a:solidFill>
                   <a:srgbClr val="FFFFFF"/>
                 </a:solidFill>
               </a14:hiddenFill>
             </a:ext>
             <a:ext uri="{91240B29-F687-4f45-9708-019B960494DF}">
-              <a14:hiddenLine xmlns="" xmlns:a14="http://schemas.microsoft.com/office/drawing/2010/main" w="9525">
+              <a14:hiddenLine xmlns:a14="http://schemas.microsoft.com/office/drawing/2010/main" xmlns="" w="9525">
                 <a:solidFill>
                   <a:srgbClr val="000000"/>
                 </a:solidFill>
@@ -12787,14 +12787,14 @@
           </a:ln>
           <a:extLst>
             <a:ext uri="{909E8E84-426E-40dd-AFC4-6F175D3DCCD1}">
-              <a14:hiddenFill xmlns="" xmlns:a14="http://schemas.microsoft.com/office/drawing/2010/main">
+              <a14:hiddenFill xmlns:a14="http://schemas.microsoft.com/office/drawing/2010/main" xmlns="">
                 <a:solidFill>
                   <a:srgbClr val="FFFFFF"/>
                 </a:solidFill>
               </a14:hiddenFill>
             </a:ext>
             <a:ext uri="{91240B29-F687-4f45-9708-019B960494DF}">
-              <a14:hiddenLine xmlns="" xmlns:a14="http://schemas.microsoft.com/office/drawing/2010/main" w="9525">
+              <a14:hiddenLine xmlns:a14="http://schemas.microsoft.com/office/drawing/2010/main" xmlns="" w="9525">
                 <a:solidFill>
                   <a:srgbClr val="000000"/>
                 </a:solidFill>
@@ -14866,14 +14866,14 @@
           </a:ln>
           <a:extLst>
             <a:ext uri="{909E8E84-426E-40dd-AFC4-6F175D3DCCD1}">
-              <a14:hiddenFill xmlns="" xmlns:a14="http://schemas.microsoft.com/office/drawing/2010/main">
+              <a14:hiddenFill xmlns:a14="http://schemas.microsoft.com/office/drawing/2010/main" xmlns="">
                 <a:solidFill>
                   <a:srgbClr val="FFFFFF"/>
                 </a:solidFill>
               </a14:hiddenFill>
             </a:ext>
             <a:ext uri="{91240B29-F687-4f45-9708-019B960494DF}">
-              <a14:hiddenLine xmlns="" xmlns:a14="http://schemas.microsoft.com/office/drawing/2010/main" w="9525">
+              <a14:hiddenLine xmlns:a14="http://schemas.microsoft.com/office/drawing/2010/main" xmlns="" w="9525">
                 <a:solidFill>
                   <a:srgbClr val="000000"/>
                 </a:solidFill>
@@ -14958,14 +14958,14 @@
           </a:ln>
           <a:extLst>
             <a:ext uri="{909E8E84-426E-40dd-AFC4-6F175D3DCCD1}">
-              <a14:hiddenFill xmlns="" xmlns:a14="http://schemas.microsoft.com/office/drawing/2010/main">
+              <a14:hiddenFill xmlns:a14="http://schemas.microsoft.com/office/drawing/2010/main" xmlns="">
                 <a:solidFill>
                   <a:srgbClr val="FFFFFF"/>
                 </a:solidFill>
               </a14:hiddenFill>
             </a:ext>
             <a:ext uri="{91240B29-F687-4f45-9708-019B960494DF}">
-              <a14:hiddenLine xmlns="" xmlns:a14="http://schemas.microsoft.com/office/drawing/2010/main" w="9525">
+              <a14:hiddenLine xmlns:a14="http://schemas.microsoft.com/office/drawing/2010/main" xmlns="" w="9525">
                 <a:solidFill>
                   <a:srgbClr val="000000"/>
                 </a:solidFill>
@@ -15065,14 +15065,14 @@
           </a:ln>
           <a:extLst>
             <a:ext uri="{909E8E84-426E-40dd-AFC4-6F175D3DCCD1}">
-              <a14:hiddenFill xmlns="" xmlns:a14="http://schemas.microsoft.com/office/drawing/2010/main">
+              <a14:hiddenFill xmlns:a14="http://schemas.microsoft.com/office/drawing/2010/main" xmlns="">
                 <a:solidFill>
                   <a:srgbClr val="FFFFFF"/>
                 </a:solidFill>
               </a14:hiddenFill>
             </a:ext>
             <a:ext uri="{91240B29-F687-4f45-9708-019B960494DF}">
-              <a14:hiddenLine xmlns="" xmlns:a14="http://schemas.microsoft.com/office/drawing/2010/main" w="9525">
+              <a14:hiddenLine xmlns:a14="http://schemas.microsoft.com/office/drawing/2010/main" xmlns="" w="9525">
                 <a:solidFill>
                   <a:srgbClr val="000000"/>
                 </a:solidFill>
@@ -15138,14 +15138,14 @@
           </a:ln>
           <a:extLst>
             <a:ext uri="{909E8E84-426E-40dd-AFC4-6F175D3DCCD1}">
-              <a14:hiddenFill xmlns="" xmlns:a14="http://schemas.microsoft.com/office/drawing/2010/main">
+              <a14:hiddenFill xmlns:a14="http://schemas.microsoft.com/office/drawing/2010/main" xmlns="">
                 <a:solidFill>
                   <a:srgbClr val="FFFFFF"/>
                 </a:solidFill>
               </a14:hiddenFill>
             </a:ext>
             <a:ext uri="{91240B29-F687-4f45-9708-019B960494DF}">
-              <a14:hiddenLine xmlns="" xmlns:a14="http://schemas.microsoft.com/office/drawing/2010/main" w="9525">
+              <a14:hiddenLine xmlns:a14="http://schemas.microsoft.com/office/drawing/2010/main" xmlns="" w="9525">
                 <a:solidFill>
                   <a:srgbClr val="000000"/>
                 </a:solidFill>
@@ -15248,14 +15248,14 @@
           </a:ln>
           <a:extLst>
             <a:ext uri="{909E8E84-426E-40dd-AFC4-6F175D3DCCD1}">
-              <a14:hiddenFill xmlns="" xmlns:a14="http://schemas.microsoft.com/office/drawing/2010/main">
+              <a14:hiddenFill xmlns:a14="http://schemas.microsoft.com/office/drawing/2010/main" xmlns="">
                 <a:solidFill>
                   <a:srgbClr val="FFFFFF"/>
                 </a:solidFill>
               </a14:hiddenFill>
             </a:ext>
             <a:ext uri="{91240B29-F687-4f45-9708-019B960494DF}">
-              <a14:hiddenLine xmlns="" xmlns:a14="http://schemas.microsoft.com/office/drawing/2010/main" w="9525">
+              <a14:hiddenLine xmlns:a14="http://schemas.microsoft.com/office/drawing/2010/main" xmlns="" w="9525">
                 <a:solidFill>
                   <a:srgbClr val="000000"/>
                 </a:solidFill>
@@ -15394,14 +15394,14 @@
           </a:ln>
           <a:extLst>
             <a:ext uri="{909E8E84-426E-40dd-AFC4-6F175D3DCCD1}">
-              <a14:hiddenFill xmlns="" xmlns:a14="http://schemas.microsoft.com/office/drawing/2010/main">
+              <a14:hiddenFill xmlns:a14="http://schemas.microsoft.com/office/drawing/2010/main" xmlns="">
                 <a:solidFill>
                   <a:srgbClr val="FFFFFF"/>
                 </a:solidFill>
               </a14:hiddenFill>
             </a:ext>
             <a:ext uri="{91240B29-F687-4f45-9708-019B960494DF}">
-              <a14:hiddenLine xmlns="" xmlns:a14="http://schemas.microsoft.com/office/drawing/2010/main" w="9525">
+              <a14:hiddenLine xmlns:a14="http://schemas.microsoft.com/office/drawing/2010/main" xmlns="" w="9525">
                 <a:solidFill>
                   <a:srgbClr val="000000"/>
                 </a:solidFill>
@@ -15473,14 +15473,14 @@
           </a:ln>
           <a:extLst>
             <a:ext uri="{909E8E84-426E-40dd-AFC4-6F175D3DCCD1}">
-              <a14:hiddenFill xmlns="" xmlns:a14="http://schemas.microsoft.com/office/drawing/2010/main">
+              <a14:hiddenFill xmlns:a14="http://schemas.microsoft.com/office/drawing/2010/main" xmlns="">
                 <a:solidFill>
                   <a:srgbClr val="FFFFFF"/>
                 </a:solidFill>
               </a14:hiddenFill>
             </a:ext>
             <a:ext uri="{91240B29-F687-4f45-9708-019B960494DF}">
-              <a14:hiddenLine xmlns="" xmlns:a14="http://schemas.microsoft.com/office/drawing/2010/main" w="9525">
+              <a14:hiddenLine xmlns:a14="http://schemas.microsoft.com/office/drawing/2010/main" xmlns="" w="9525">
                 <a:solidFill>
                   <a:srgbClr val="000000"/>
                 </a:solidFill>
@@ -15573,14 +15573,14 @@
           </a:ln>
           <a:extLst>
             <a:ext uri="{909E8E84-426E-40dd-AFC4-6F175D3DCCD1}">
-              <a14:hiddenFill xmlns="" xmlns:a14="http://schemas.microsoft.com/office/drawing/2010/main">
+              <a14:hiddenFill xmlns:a14="http://schemas.microsoft.com/office/drawing/2010/main" xmlns="">
                 <a:solidFill>
                   <a:srgbClr val="FFFFFF"/>
                 </a:solidFill>
               </a14:hiddenFill>
             </a:ext>
             <a:ext uri="{91240B29-F687-4f45-9708-019B960494DF}">
-              <a14:hiddenLine xmlns="" xmlns:a14="http://schemas.microsoft.com/office/drawing/2010/main" w="9525">
+              <a14:hiddenLine xmlns:a14="http://schemas.microsoft.com/office/drawing/2010/main" xmlns="" w="9525">
                 <a:solidFill>
                   <a:srgbClr val="000000"/>
                 </a:solidFill>
@@ -15718,14 +15718,14 @@
           </a:ln>
           <a:extLst>
             <a:ext uri="{909E8E84-426E-40dd-AFC4-6F175D3DCCD1}">
-              <a14:hiddenFill xmlns="" xmlns:a14="http://schemas.microsoft.com/office/drawing/2010/main">
+              <a14:hiddenFill xmlns:a14="http://schemas.microsoft.com/office/drawing/2010/main" xmlns="">
                 <a:solidFill>
                   <a:srgbClr val="FFFFFF"/>
                 </a:solidFill>
               </a14:hiddenFill>
             </a:ext>
             <a:ext uri="{91240B29-F687-4f45-9708-019B960494DF}">
-              <a14:hiddenLine xmlns="" xmlns:a14="http://schemas.microsoft.com/office/drawing/2010/main" w="9525">
+              <a14:hiddenLine xmlns:a14="http://schemas.microsoft.com/office/drawing/2010/main" xmlns="" w="9525">
                 <a:solidFill>
                   <a:srgbClr val="000000"/>
                 </a:solidFill>
@@ -15789,14 +15789,14 @@
           </a:ln>
           <a:extLst>
             <a:ext uri="{909E8E84-426E-40dd-AFC4-6F175D3DCCD1}">
-              <a14:hiddenFill xmlns="" xmlns:a14="http://schemas.microsoft.com/office/drawing/2010/main">
+              <a14:hiddenFill xmlns:a14="http://schemas.microsoft.com/office/drawing/2010/main" xmlns="">
                 <a:solidFill>
                   <a:srgbClr val="FFFFFF"/>
                 </a:solidFill>
               </a14:hiddenFill>
             </a:ext>
             <a:ext uri="{91240B29-F687-4f45-9708-019B960494DF}">
-              <a14:hiddenLine xmlns="" xmlns:a14="http://schemas.microsoft.com/office/drawing/2010/main" w="9525">
+              <a14:hiddenLine xmlns:a14="http://schemas.microsoft.com/office/drawing/2010/main" xmlns="" w="9525">
                 <a:solidFill>
                   <a:srgbClr val="000000"/>
                 </a:solidFill>
@@ -15943,14 +15943,14 @@
           </a:ln>
           <a:extLst>
             <a:ext uri="{909E8E84-426E-40dd-AFC4-6F175D3DCCD1}">
-              <a14:hiddenFill xmlns="" xmlns:a14="http://schemas.microsoft.com/office/drawing/2010/main">
+              <a14:hiddenFill xmlns:a14="http://schemas.microsoft.com/office/drawing/2010/main" xmlns="">
                 <a:solidFill>
                   <a:srgbClr val="FFFFFF"/>
                 </a:solidFill>
               </a14:hiddenFill>
             </a:ext>
             <a:ext uri="{91240B29-F687-4f45-9708-019B960494DF}">
-              <a14:hiddenLine xmlns="" xmlns:a14="http://schemas.microsoft.com/office/drawing/2010/main" w="9525">
+              <a14:hiddenLine xmlns:a14="http://schemas.microsoft.com/office/drawing/2010/main" xmlns="" w="9525">
                 <a:solidFill>
                   <a:srgbClr val="000000"/>
                 </a:solidFill>
@@ -16097,14 +16097,14 @@
           </a:ln>
           <a:extLst>
             <a:ext uri="{909E8E84-426E-40dd-AFC4-6F175D3DCCD1}">
-              <a14:hiddenFill xmlns="" xmlns:a14="http://schemas.microsoft.com/office/drawing/2010/main">
+              <a14:hiddenFill xmlns:a14="http://schemas.microsoft.com/office/drawing/2010/main" xmlns="">
                 <a:solidFill>
                   <a:srgbClr val="FFFFFF"/>
                 </a:solidFill>
               </a14:hiddenFill>
             </a:ext>
             <a:ext uri="{91240B29-F687-4f45-9708-019B960494DF}">
-              <a14:hiddenLine xmlns="" xmlns:a14="http://schemas.microsoft.com/office/drawing/2010/main" w="9525">
+              <a14:hiddenLine xmlns:a14="http://schemas.microsoft.com/office/drawing/2010/main" xmlns="" w="9525">
                 <a:solidFill>
                   <a:srgbClr val="000000"/>
                 </a:solidFill>
@@ -16176,14 +16176,14 @@
           </a:ln>
           <a:extLst>
             <a:ext uri="{909E8E84-426E-40dd-AFC4-6F175D3DCCD1}">
-              <a14:hiddenFill xmlns="" xmlns:a14="http://schemas.microsoft.com/office/drawing/2010/main">
+              <a14:hiddenFill xmlns:a14="http://schemas.microsoft.com/office/drawing/2010/main" xmlns="">
                 <a:solidFill>
                   <a:srgbClr val="FFFFFF"/>
                 </a:solidFill>
               </a14:hiddenFill>
             </a:ext>
             <a:ext uri="{91240B29-F687-4f45-9708-019B960494DF}">
-              <a14:hiddenLine xmlns="" xmlns:a14="http://schemas.microsoft.com/office/drawing/2010/main" w="9525">
+              <a14:hiddenLine xmlns:a14="http://schemas.microsoft.com/office/drawing/2010/main" xmlns="" w="9525">
                 <a:solidFill>
                   <a:srgbClr val="000000"/>
                 </a:solidFill>
@@ -16276,14 +16276,14 @@
           </a:ln>
           <a:extLst>
             <a:ext uri="{909E8E84-426E-40dd-AFC4-6F175D3DCCD1}">
-              <a14:hiddenFill xmlns="" xmlns:a14="http://schemas.microsoft.com/office/drawing/2010/main">
+              <a14:hiddenFill xmlns:a14="http://schemas.microsoft.com/office/drawing/2010/main" xmlns="">
                 <a:solidFill>
                   <a:srgbClr val="FFFFFF"/>
                 </a:solidFill>
               </a14:hiddenFill>
             </a:ext>
             <a:ext uri="{91240B29-F687-4f45-9708-019B960494DF}">
-              <a14:hiddenLine xmlns="" xmlns:a14="http://schemas.microsoft.com/office/drawing/2010/main" w="9525">
+              <a14:hiddenLine xmlns:a14="http://schemas.microsoft.com/office/drawing/2010/main" xmlns="" w="9525">
                 <a:solidFill>
                   <a:srgbClr val="000000"/>
                 </a:solidFill>
@@ -16391,14 +16391,14 @@
           </a:ln>
           <a:extLst>
             <a:ext uri="{909E8E84-426E-40dd-AFC4-6F175D3DCCD1}">
-              <a14:hiddenFill xmlns="" xmlns:a14="http://schemas.microsoft.com/office/drawing/2010/main">
+              <a14:hiddenFill xmlns:a14="http://schemas.microsoft.com/office/drawing/2010/main" xmlns="">
                 <a:solidFill>
                   <a:srgbClr val="FFFFFF"/>
                 </a:solidFill>
               </a14:hiddenFill>
             </a:ext>
             <a:ext uri="{91240B29-F687-4f45-9708-019B960494DF}">
-              <a14:hiddenLine xmlns="" xmlns:a14="http://schemas.microsoft.com/office/drawing/2010/main" w="9525">
+              <a14:hiddenLine xmlns:a14="http://schemas.microsoft.com/office/drawing/2010/main" xmlns="" w="9525">
                 <a:solidFill>
                   <a:srgbClr val="000000"/>
                 </a:solidFill>
@@ -16470,14 +16470,14 @@
           </a:ln>
           <a:extLst>
             <a:ext uri="{909E8E84-426E-40dd-AFC4-6F175D3DCCD1}">
-              <a14:hiddenFill xmlns="" xmlns:a14="http://schemas.microsoft.com/office/drawing/2010/main">
+              <a14:hiddenFill xmlns:a14="http://schemas.microsoft.com/office/drawing/2010/main" xmlns="">
                 <a:solidFill>
                   <a:srgbClr val="FFFFFF"/>
                 </a:solidFill>
               </a14:hiddenFill>
             </a:ext>
             <a:ext uri="{91240B29-F687-4f45-9708-019B960494DF}">
-              <a14:hiddenLine xmlns="" xmlns:a14="http://schemas.microsoft.com/office/drawing/2010/main" w="9525">
+              <a14:hiddenLine xmlns:a14="http://schemas.microsoft.com/office/drawing/2010/main" xmlns="" w="9525">
                 <a:solidFill>
                   <a:srgbClr val="000000"/>
                 </a:solidFill>
@@ -16624,14 +16624,14 @@
           </a:ln>
           <a:extLst>
             <a:ext uri="{909E8E84-426E-40dd-AFC4-6F175D3DCCD1}">
-              <a14:hiddenFill xmlns="" xmlns:a14="http://schemas.microsoft.com/office/drawing/2010/main">
+              <a14:hiddenFill xmlns:a14="http://schemas.microsoft.com/office/drawing/2010/main" xmlns="">
                 <a:solidFill>
                   <a:srgbClr val="FFFFFF"/>
                 </a:solidFill>
               </a14:hiddenFill>
             </a:ext>
             <a:ext uri="{91240B29-F687-4f45-9708-019B960494DF}">
-              <a14:hiddenLine xmlns="" xmlns:a14="http://schemas.microsoft.com/office/drawing/2010/main" w="9525">
+              <a14:hiddenLine xmlns:a14="http://schemas.microsoft.com/office/drawing/2010/main" xmlns="" w="9525">
                 <a:solidFill>
                   <a:srgbClr val="000000"/>
                 </a:solidFill>
@@ -16739,14 +16739,14 @@
           </a:ln>
           <a:extLst>
             <a:ext uri="{909E8E84-426E-40dd-AFC4-6F175D3DCCD1}">
-              <a14:hiddenFill xmlns="" xmlns:a14="http://schemas.microsoft.com/office/drawing/2010/main">
+              <a14:hiddenFill xmlns:a14="http://schemas.microsoft.com/office/drawing/2010/main" xmlns="">
                 <a:solidFill>
                   <a:srgbClr val="FFFFFF"/>
                 </a:solidFill>
               </a14:hiddenFill>
             </a:ext>
             <a:ext uri="{91240B29-F687-4f45-9708-019B960494DF}">
-              <a14:hiddenLine xmlns="" xmlns:a14="http://schemas.microsoft.com/office/drawing/2010/main" w="9525">
+              <a14:hiddenLine xmlns:a14="http://schemas.microsoft.com/office/drawing/2010/main" xmlns="" w="9525">
                 <a:solidFill>
                   <a:srgbClr val="000000"/>
                 </a:solidFill>
@@ -16818,14 +16818,14 @@
           </a:ln>
           <a:extLst>
             <a:ext uri="{909E8E84-426E-40dd-AFC4-6F175D3DCCD1}">
-              <a14:hiddenFill xmlns="" xmlns:a14="http://schemas.microsoft.com/office/drawing/2010/main">
+              <a14:hiddenFill xmlns:a14="http://schemas.microsoft.com/office/drawing/2010/main" xmlns="">
                 <a:solidFill>
                   <a:srgbClr val="FFFFFF"/>
                 </a:solidFill>
               </a14:hiddenFill>
             </a:ext>
             <a:ext uri="{91240B29-F687-4f45-9708-019B960494DF}">
-              <a14:hiddenLine xmlns="" xmlns:a14="http://schemas.microsoft.com/office/drawing/2010/main" w="9525">
+              <a14:hiddenLine xmlns:a14="http://schemas.microsoft.com/office/drawing/2010/main" xmlns="" w="9525">
                 <a:solidFill>
                   <a:srgbClr val="000000"/>
                 </a:solidFill>
@@ -17026,14 +17026,14 @@
           </a:ln>
           <a:extLst>
             <a:ext uri="{909E8E84-426E-40dd-AFC4-6F175D3DCCD1}">
-              <a14:hiddenFill xmlns="" xmlns:a14="http://schemas.microsoft.com/office/drawing/2010/main">
+              <a14:hiddenFill xmlns:a14="http://schemas.microsoft.com/office/drawing/2010/main" xmlns="">
                 <a:solidFill>
                   <a:srgbClr val="FFFFFF"/>
                 </a:solidFill>
               </a14:hiddenFill>
             </a:ext>
             <a:ext uri="{91240B29-F687-4f45-9708-019B960494DF}">
-              <a14:hiddenLine xmlns="" xmlns:a14="http://schemas.microsoft.com/office/drawing/2010/main" w="9525">
+              <a14:hiddenLine xmlns:a14="http://schemas.microsoft.com/office/drawing/2010/main" xmlns="" w="9525">
                 <a:solidFill>
                   <a:srgbClr val="000000"/>
                 </a:solidFill>
@@ -17141,14 +17141,14 @@
           </a:ln>
           <a:extLst>
             <a:ext uri="{909E8E84-426E-40dd-AFC4-6F175D3DCCD1}">
-              <a14:hiddenFill xmlns="" xmlns:a14="http://schemas.microsoft.com/office/drawing/2010/main">
+              <a14:hiddenFill xmlns:a14="http://schemas.microsoft.com/office/drawing/2010/main" xmlns="">
                 <a:solidFill>
                   <a:srgbClr val="FFFFFF"/>
                 </a:solidFill>
               </a14:hiddenFill>
             </a:ext>
             <a:ext uri="{91240B29-F687-4f45-9708-019B960494DF}">
-              <a14:hiddenLine xmlns="" xmlns:a14="http://schemas.microsoft.com/office/drawing/2010/main" w="9525">
+              <a14:hiddenLine xmlns:a14="http://schemas.microsoft.com/office/drawing/2010/main" xmlns="" w="9525">
                 <a:solidFill>
                   <a:srgbClr val="000000"/>
                 </a:solidFill>
@@ -17220,14 +17220,14 @@
           </a:ln>
           <a:extLst>
             <a:ext uri="{909E8E84-426E-40dd-AFC4-6F175D3DCCD1}">
-              <a14:hiddenFill xmlns="" xmlns:a14="http://schemas.microsoft.com/office/drawing/2010/main">
+              <a14:hiddenFill xmlns:a14="http://schemas.microsoft.com/office/drawing/2010/main" xmlns="">
                 <a:solidFill>
                   <a:srgbClr val="FFFFFF"/>
                 </a:solidFill>
               </a14:hiddenFill>
             </a:ext>
             <a:ext uri="{91240B29-F687-4f45-9708-019B960494DF}">
-              <a14:hiddenLine xmlns="" xmlns:a14="http://schemas.microsoft.com/office/drawing/2010/main" w="9525">
+              <a14:hiddenLine xmlns:a14="http://schemas.microsoft.com/office/drawing/2010/main" xmlns="" w="9525">
                 <a:solidFill>
                   <a:srgbClr val="000000"/>
                 </a:solidFill>
@@ -17335,14 +17335,14 @@
           </a:ln>
           <a:extLst>
             <a:ext uri="{909E8E84-426E-40dd-AFC4-6F175D3DCCD1}">
-              <a14:hiddenFill xmlns="" xmlns:a14="http://schemas.microsoft.com/office/drawing/2010/main">
+              <a14:hiddenFill xmlns:a14="http://schemas.microsoft.com/office/drawing/2010/main" xmlns="">
                 <a:solidFill>
                   <a:srgbClr val="FFFFFF"/>
                 </a:solidFill>
               </a14:hiddenFill>
             </a:ext>
             <a:ext uri="{91240B29-F687-4f45-9708-019B960494DF}">
-              <a14:hiddenLine xmlns="" xmlns:a14="http://schemas.microsoft.com/office/drawing/2010/main" w="9525">
+              <a14:hiddenLine xmlns:a14="http://schemas.microsoft.com/office/drawing/2010/main" xmlns="" w="9525">
                 <a:solidFill>
                   <a:srgbClr val="000000"/>
                 </a:solidFill>
@@ -17507,14 +17507,14 @@
           </a:ln>
           <a:extLst>
             <a:ext uri="{909E8E84-426E-40dd-AFC4-6F175D3DCCD1}">
-              <a14:hiddenFill xmlns="" xmlns:a14="http://schemas.microsoft.com/office/drawing/2010/main">
+              <a14:hiddenFill xmlns:a14="http://schemas.microsoft.com/office/drawing/2010/main" xmlns="">
                 <a:solidFill>
                   <a:srgbClr val="FFFFFF"/>
                 </a:solidFill>
               </a14:hiddenFill>
             </a:ext>
             <a:ext uri="{91240B29-F687-4f45-9708-019B960494DF}">
-              <a14:hiddenLine xmlns="" xmlns:a14="http://schemas.microsoft.com/office/drawing/2010/main" w="9525">
+              <a14:hiddenLine xmlns:a14="http://schemas.microsoft.com/office/drawing/2010/main" xmlns="" w="9525">
                 <a:solidFill>
                   <a:srgbClr val="000000"/>
                 </a:solidFill>
@@ -19544,14 +19544,14 @@
           </a:ln>
           <a:extLst>
             <a:ext uri="{909E8E84-426E-40dd-AFC4-6F175D3DCCD1}">
-              <a14:hiddenFill xmlns="" xmlns:a14="http://schemas.microsoft.com/office/drawing/2010/main">
+              <a14:hiddenFill xmlns:a14="http://schemas.microsoft.com/office/drawing/2010/main" xmlns="">
                 <a:solidFill>
                   <a:srgbClr val="FFFFFF"/>
                 </a:solidFill>
               </a14:hiddenFill>
             </a:ext>
             <a:ext uri="{91240B29-F687-4f45-9708-019B960494DF}">
-              <a14:hiddenLine xmlns="" xmlns:a14="http://schemas.microsoft.com/office/drawing/2010/main" w="9525">
+              <a14:hiddenLine xmlns:a14="http://schemas.microsoft.com/office/drawing/2010/main" xmlns="" w="9525">
                 <a:solidFill>
                   <a:srgbClr val="000000"/>
                 </a:solidFill>
@@ -19663,14 +19663,14 @@
           </a:ln>
           <a:extLst>
             <a:ext uri="{909E8E84-426E-40dd-AFC4-6F175D3DCCD1}">
-              <a14:hiddenFill xmlns="" xmlns:a14="http://schemas.microsoft.com/office/drawing/2010/main">
+              <a14:hiddenFill xmlns:a14="http://schemas.microsoft.com/office/drawing/2010/main" xmlns="">
                 <a:solidFill>
                   <a:srgbClr val="FFFFFF"/>
                 </a:solidFill>
               </a14:hiddenFill>
             </a:ext>
             <a:ext uri="{91240B29-F687-4f45-9708-019B960494DF}">
-              <a14:hiddenLine xmlns="" xmlns:a14="http://schemas.microsoft.com/office/drawing/2010/main" w="9525">
+              <a14:hiddenLine xmlns:a14="http://schemas.microsoft.com/office/drawing/2010/main" xmlns="" w="9525">
                 <a:solidFill>
                   <a:srgbClr val="000000"/>
                 </a:solidFill>
@@ -19742,14 +19742,14 @@
           </a:ln>
           <a:extLst>
             <a:ext uri="{909E8E84-426E-40dd-AFC4-6F175D3DCCD1}">
-              <a14:hiddenFill xmlns="" xmlns:a14="http://schemas.microsoft.com/office/drawing/2010/main">
+              <a14:hiddenFill xmlns:a14="http://schemas.microsoft.com/office/drawing/2010/main" xmlns="">
                 <a:solidFill>
                   <a:srgbClr val="FFFFFF"/>
                 </a:solidFill>
               </a14:hiddenFill>
             </a:ext>
             <a:ext uri="{91240B29-F687-4f45-9708-019B960494DF}">
-              <a14:hiddenLine xmlns="" xmlns:a14="http://schemas.microsoft.com/office/drawing/2010/main" w="9525">
+              <a14:hiddenLine xmlns:a14="http://schemas.microsoft.com/office/drawing/2010/main" xmlns="" w="9525">
                 <a:solidFill>
                   <a:srgbClr val="000000"/>
                 </a:solidFill>
@@ -19860,14 +19860,14 @@
           </a:ln>
           <a:extLst>
             <a:ext uri="{909E8E84-426E-40dd-AFC4-6F175D3DCCD1}">
-              <a14:hiddenFill xmlns="" xmlns:a14="http://schemas.microsoft.com/office/drawing/2010/main">
+              <a14:hiddenFill xmlns:a14="http://schemas.microsoft.com/office/drawing/2010/main" xmlns="">
                 <a:solidFill>
                   <a:srgbClr val="FFFFFF"/>
                 </a:solidFill>
               </a14:hiddenFill>
             </a:ext>
             <a:ext uri="{91240B29-F687-4f45-9708-019B960494DF}">
-              <a14:hiddenLine xmlns="" xmlns:a14="http://schemas.microsoft.com/office/drawing/2010/main" w="9525">
+              <a14:hiddenLine xmlns:a14="http://schemas.microsoft.com/office/drawing/2010/main" xmlns="" w="9525">
                 <a:solidFill>
                   <a:srgbClr val="000000"/>
                 </a:solidFill>
@@ -19957,14 +19957,14 @@
           </a:ln>
           <a:extLst>
             <a:ext uri="{909E8E84-426E-40dd-AFC4-6F175D3DCCD1}">
-              <a14:hiddenFill xmlns="" xmlns:a14="http://schemas.microsoft.com/office/drawing/2010/main">
+              <a14:hiddenFill xmlns:a14="http://schemas.microsoft.com/office/drawing/2010/main" xmlns="">
                 <a:solidFill>
                   <a:srgbClr val="FFFFFF"/>
                 </a:solidFill>
               </a14:hiddenFill>
             </a:ext>
             <a:ext uri="{91240B29-F687-4f45-9708-019B960494DF}">
-              <a14:hiddenLine xmlns="" xmlns:a14="http://schemas.microsoft.com/office/drawing/2010/main" w="9525">
+              <a14:hiddenLine xmlns:a14="http://schemas.microsoft.com/office/drawing/2010/main" xmlns="" w="9525">
                 <a:solidFill>
                   <a:srgbClr val="000000"/>
                 </a:solidFill>
@@ -20066,14 +20066,14 @@
           </a:ln>
           <a:extLst>
             <a:ext uri="{909E8E84-426E-40dd-AFC4-6F175D3DCCD1}">
-              <a14:hiddenFill xmlns="" xmlns:a14="http://schemas.microsoft.com/office/drawing/2010/main">
+              <a14:hiddenFill xmlns:a14="http://schemas.microsoft.com/office/drawing/2010/main" xmlns="">
                 <a:solidFill>
                   <a:srgbClr val="FFFFFF"/>
                 </a:solidFill>
               </a14:hiddenFill>
             </a:ext>
             <a:ext uri="{91240B29-F687-4f45-9708-019B960494DF}">
-              <a14:hiddenLine xmlns="" xmlns:a14="http://schemas.microsoft.com/office/drawing/2010/main" w="9525">
+              <a14:hiddenLine xmlns:a14="http://schemas.microsoft.com/office/drawing/2010/main" xmlns="" w="9525">
                 <a:solidFill>
                   <a:srgbClr val="000000"/>
                 </a:solidFill>
@@ -20145,14 +20145,14 @@
           </a:ln>
           <a:extLst>
             <a:ext uri="{909E8E84-426E-40dd-AFC4-6F175D3DCCD1}">
-              <a14:hiddenFill xmlns="" xmlns:a14="http://schemas.microsoft.com/office/drawing/2010/main">
+              <a14:hiddenFill xmlns:a14="http://schemas.microsoft.com/office/drawing/2010/main" xmlns="">
                 <a:solidFill>
                   <a:srgbClr val="FFFFFF"/>
                 </a:solidFill>
               </a14:hiddenFill>
             </a:ext>
             <a:ext uri="{91240B29-F687-4f45-9708-019B960494DF}">
-              <a14:hiddenLine xmlns="" xmlns:a14="http://schemas.microsoft.com/office/drawing/2010/main" w="9525">
+              <a14:hiddenLine xmlns:a14="http://schemas.microsoft.com/office/drawing/2010/main" xmlns="" w="9525">
                 <a:solidFill>
                   <a:srgbClr val="000000"/>
                 </a:solidFill>
@@ -20245,14 +20245,14 @@
           </a:ln>
           <a:extLst>
             <a:ext uri="{909E8E84-426E-40dd-AFC4-6F175D3DCCD1}">
-              <a14:hiddenFill xmlns="" xmlns:a14="http://schemas.microsoft.com/office/drawing/2010/main">
+              <a14:hiddenFill xmlns:a14="http://schemas.microsoft.com/office/drawing/2010/main" xmlns="">
                 <a:solidFill>
                   <a:srgbClr val="FFFFFF"/>
                 </a:solidFill>
               </a14:hiddenFill>
             </a:ext>
             <a:ext uri="{91240B29-F687-4f45-9708-019B960494DF}">
-              <a14:hiddenLine xmlns="" xmlns:a14="http://schemas.microsoft.com/office/drawing/2010/main" w="9525">
+              <a14:hiddenLine xmlns:a14="http://schemas.microsoft.com/office/drawing/2010/main" xmlns="" w="9525">
                 <a:solidFill>
                   <a:srgbClr val="000000"/>
                 </a:solidFill>
@@ -20324,14 +20324,14 @@
           </a:ln>
           <a:extLst>
             <a:ext uri="{909E8E84-426E-40dd-AFC4-6F175D3DCCD1}">
-              <a14:hiddenFill xmlns="" xmlns:a14="http://schemas.microsoft.com/office/drawing/2010/main">
+              <a14:hiddenFill xmlns:a14="http://schemas.microsoft.com/office/drawing/2010/main" xmlns="">
                 <a:solidFill>
                   <a:srgbClr val="FFFFFF"/>
                 </a:solidFill>
               </a14:hiddenFill>
             </a:ext>
             <a:ext uri="{91240B29-F687-4f45-9708-019B960494DF}">
-              <a14:hiddenLine xmlns="" xmlns:a14="http://schemas.microsoft.com/office/drawing/2010/main" w="9525">
+              <a14:hiddenLine xmlns:a14="http://schemas.microsoft.com/office/drawing/2010/main" xmlns="" w="9525">
                 <a:solidFill>
                   <a:srgbClr val="000000"/>
                 </a:solidFill>
@@ -20570,14 +20570,14 @@
           </a:ln>
           <a:extLst>
             <a:ext uri="{909E8E84-426E-40dd-AFC4-6F175D3DCCD1}">
-              <a14:hiddenFill xmlns="" xmlns:a14="http://schemas.microsoft.com/office/drawing/2010/main">
+              <a14:hiddenFill xmlns:a14="http://schemas.microsoft.com/office/drawing/2010/main" xmlns="">
                 <a:solidFill>
                   <a:srgbClr val="FFFFFF"/>
                 </a:solidFill>
               </a14:hiddenFill>
             </a:ext>
             <a:ext uri="{91240B29-F687-4f45-9708-019B960494DF}">
-              <a14:hiddenLine xmlns="" xmlns:a14="http://schemas.microsoft.com/office/drawing/2010/main" w="9525">
+              <a14:hiddenLine xmlns:a14="http://schemas.microsoft.com/office/drawing/2010/main" xmlns="" w="9525">
                 <a:solidFill>
                   <a:srgbClr val="000000"/>
                 </a:solidFill>
@@ -21596,14 +21596,14 @@
         </a:ln>
         <a:extLst>
           <a:ext uri="{909E8E84-426E-40dd-AFC4-6F175D3DCCD1}">
-            <a14:hiddenFill xmlns="" xmlns:a14="http://schemas.microsoft.com/office/drawing/2010/main">
+            <a14:hiddenFill xmlns:a14="http://schemas.microsoft.com/office/drawing/2010/main" xmlns="">
               <a:solidFill>
                 <a:srgbClr val="FFFFFF"/>
               </a:solidFill>
             </a14:hiddenFill>
           </a:ext>
           <a:ext uri="{91240B29-F687-4f45-9708-019B960494DF}">
-            <a14:hiddenLine xmlns="" xmlns:a14="http://schemas.microsoft.com/office/drawing/2010/main" w="9525">
+            <a14:hiddenLine xmlns:a14="http://schemas.microsoft.com/office/drawing/2010/main" xmlns="" w="9525">
               <a:solidFill>
                 <a:srgbClr val="000000"/>
               </a:solidFill>
@@ -22027,14 +22027,14 @@
         </a:ln>
         <a:extLst>
           <a:ext uri="{909E8E84-426E-40dd-AFC4-6F175D3DCCD1}">
-            <a14:hiddenFill xmlns:a14="http://schemas.microsoft.com/office/drawing/2010/main" xmlns="">
+            <a14:hiddenFill xmlns="" xmlns:a14="http://schemas.microsoft.com/office/drawing/2010/main">
               <a:solidFill>
                 <a:srgbClr val="FFFFFF"/>
               </a:solidFill>
             </a14:hiddenFill>
           </a:ext>
           <a:ext uri="{91240B29-F687-4f45-9708-019B960494DF}">
-            <a14:hiddenLine xmlns:a14="http://schemas.microsoft.com/office/drawing/2010/main" xmlns="" w="9525">
+            <a14:hiddenLine xmlns="" xmlns:a14="http://schemas.microsoft.com/office/drawing/2010/main" w="9525">
               <a:solidFill>
                 <a:srgbClr val="000000"/>
               </a:solidFill>

</xml_diff>